<commit_message>
Created icon for VRT
</commit_message>
<xml_diff>
--- a/Artwork/VLDT_Icon.pptx
+++ b/Artwork/VLDT_Icon.pptx
@@ -7,6 +7,10 @@
   <p:sldIdLst>
     <p:sldId id="256" r:id="rId2"/>
     <p:sldId id="257" r:id="rId3"/>
+    <p:sldId id="258" r:id="rId4"/>
+    <p:sldId id="259" r:id="rId5"/>
+    <p:sldId id="260" r:id="rId6"/>
+    <p:sldId id="261" r:id="rId7"/>
   </p:sldIdLst>
   <p:sldSz cx="7200900" cy="7200900"/>
   <p:notesSz cx="6858000" cy="9144000"/>
@@ -306,7 +310,7 @@
             <a:fld id="{8B9A60A6-034F-4574-94E8-4D7C14422BFB}" type="datetimeFigureOut">
               <a:rPr lang="sv-SE" smtClean="0"/>
               <a:pPr/>
-              <a:t>2022-11-17</a:t>
+              <a:t>2022-12-30</a:t>
             </a:fld>
             <a:endParaRPr lang="sv-SE"/>
           </a:p>
@@ -473,7 +477,7 @@
             <a:fld id="{8B9A60A6-034F-4574-94E8-4D7C14422BFB}" type="datetimeFigureOut">
               <a:rPr lang="sv-SE" smtClean="0"/>
               <a:pPr/>
-              <a:t>2022-11-17</a:t>
+              <a:t>2022-12-30</a:t>
             </a:fld>
             <a:endParaRPr lang="sv-SE"/>
           </a:p>
@@ -650,7 +654,7 @@
             <a:fld id="{8B9A60A6-034F-4574-94E8-4D7C14422BFB}" type="datetimeFigureOut">
               <a:rPr lang="sv-SE" smtClean="0"/>
               <a:pPr/>
-              <a:t>2022-11-17</a:t>
+              <a:t>2022-12-30</a:t>
             </a:fld>
             <a:endParaRPr lang="sv-SE"/>
           </a:p>
@@ -817,7 +821,7 @@
             <a:fld id="{8B9A60A6-034F-4574-94E8-4D7C14422BFB}" type="datetimeFigureOut">
               <a:rPr lang="sv-SE" smtClean="0"/>
               <a:pPr/>
-              <a:t>2022-11-17</a:t>
+              <a:t>2022-12-30</a:t>
             </a:fld>
             <a:endParaRPr lang="sv-SE"/>
           </a:p>
@@ -1060,7 +1064,7 @@
             <a:fld id="{8B9A60A6-034F-4574-94E8-4D7C14422BFB}" type="datetimeFigureOut">
               <a:rPr lang="sv-SE" smtClean="0"/>
               <a:pPr/>
-              <a:t>2022-11-17</a:t>
+              <a:t>2022-12-30</a:t>
             </a:fld>
             <a:endParaRPr lang="sv-SE"/>
           </a:p>
@@ -1345,7 +1349,7 @@
             <a:fld id="{8B9A60A6-034F-4574-94E8-4D7C14422BFB}" type="datetimeFigureOut">
               <a:rPr lang="sv-SE" smtClean="0"/>
               <a:pPr/>
-              <a:t>2022-11-17</a:t>
+              <a:t>2022-12-30</a:t>
             </a:fld>
             <a:endParaRPr lang="sv-SE"/>
           </a:p>
@@ -1769,7 +1773,7 @@
             <a:fld id="{8B9A60A6-034F-4574-94E8-4D7C14422BFB}" type="datetimeFigureOut">
               <a:rPr lang="sv-SE" smtClean="0"/>
               <a:pPr/>
-              <a:t>2022-11-17</a:t>
+              <a:t>2022-12-30</a:t>
             </a:fld>
             <a:endParaRPr lang="sv-SE"/>
           </a:p>
@@ -1884,7 +1888,7 @@
             <a:fld id="{8B9A60A6-034F-4574-94E8-4D7C14422BFB}" type="datetimeFigureOut">
               <a:rPr lang="sv-SE" smtClean="0"/>
               <a:pPr/>
-              <a:t>2022-11-17</a:t>
+              <a:t>2022-12-30</a:t>
             </a:fld>
             <a:endParaRPr lang="sv-SE"/>
           </a:p>
@@ -1976,7 +1980,7 @@
             <a:fld id="{8B9A60A6-034F-4574-94E8-4D7C14422BFB}" type="datetimeFigureOut">
               <a:rPr lang="sv-SE" smtClean="0"/>
               <a:pPr/>
-              <a:t>2022-11-17</a:t>
+              <a:t>2022-12-30</a:t>
             </a:fld>
             <a:endParaRPr lang="sv-SE"/>
           </a:p>
@@ -2250,7 +2254,7 @@
             <a:fld id="{8B9A60A6-034F-4574-94E8-4D7C14422BFB}" type="datetimeFigureOut">
               <a:rPr lang="sv-SE" smtClean="0"/>
               <a:pPr/>
-              <a:t>2022-11-17</a:t>
+              <a:t>2022-12-30</a:t>
             </a:fld>
             <a:endParaRPr lang="sv-SE"/>
           </a:p>
@@ -2500,7 +2504,7 @@
             <a:fld id="{8B9A60A6-034F-4574-94E8-4D7C14422BFB}" type="datetimeFigureOut">
               <a:rPr lang="sv-SE" smtClean="0"/>
               <a:pPr/>
-              <a:t>2022-11-17</a:t>
+              <a:t>2022-12-30</a:t>
             </a:fld>
             <a:endParaRPr lang="sv-SE"/>
           </a:p>
@@ -2710,7 +2714,7 @@
             <a:fld id="{8B9A60A6-034F-4574-94E8-4D7C14422BFB}" type="datetimeFigureOut">
               <a:rPr lang="sv-SE" smtClean="0"/>
               <a:pPr/>
-              <a:t>2022-11-17</a:t>
+              <a:t>2022-12-30</a:t>
             </a:fld>
             <a:endParaRPr lang="sv-SE"/>
           </a:p>
@@ -3497,6 +3501,882 @@
 </p:sld>
 </file>
 
+<file path=ppt/slides/slide3.xml><?xml version="1.0" encoding="utf-8"?>
+<p:sld xmlns:a="http://schemas.openxmlformats.org/drawingml/2006/main" xmlns:r="http://schemas.openxmlformats.org/officeDocument/2006/relationships" xmlns:p="http://schemas.openxmlformats.org/presentationml/2006/main">
+  <p:cSld>
+    <p:spTree>
+      <p:nvGrpSpPr>
+        <p:cNvPr id="1" name=""/>
+        <p:cNvGrpSpPr/>
+        <p:nvPr/>
+      </p:nvGrpSpPr>
+      <p:grpSpPr>
+        <a:xfrm>
+          <a:off x="0" y="0"/>
+          <a:ext cx="0" cy="0"/>
+          <a:chOff x="0" y="0"/>
+          <a:chExt cx="0" cy="0"/>
+        </a:xfrm>
+      </p:grpSpPr>
+      <p:sp>
+        <p:nvSpPr>
+          <p:cNvPr id="3" name="Rektangel med rundade hörn 2"/>
+          <p:cNvSpPr/>
+          <p:nvPr/>
+        </p:nvSpPr>
+        <p:spPr>
+          <a:xfrm>
+            <a:off x="864146" y="1800250"/>
+            <a:ext cx="5467441" cy="3739606"/>
+          </a:xfrm>
+          <a:prstGeom prst="roundRect">
+            <a:avLst/>
+          </a:prstGeom>
+          <a:gradFill flip="none" rotWithShape="1">
+            <a:gsLst>
+              <a:gs pos="0">
+                <a:schemeClr val="accent5">
+                  <a:lumMod val="67000"/>
+                </a:schemeClr>
+              </a:gs>
+              <a:gs pos="48000">
+                <a:schemeClr val="accent5">
+                  <a:lumMod val="97000"/>
+                  <a:lumOff val="3000"/>
+                </a:schemeClr>
+              </a:gs>
+              <a:gs pos="100000">
+                <a:schemeClr val="accent5">
+                  <a:lumMod val="60000"/>
+                  <a:lumOff val="40000"/>
+                </a:schemeClr>
+              </a:gs>
+            </a:gsLst>
+            <a:lin ang="16200000" scaled="1"/>
+            <a:tileRect/>
+          </a:gradFill>
+          <a:ln>
+            <a:solidFill>
+              <a:schemeClr val="tx1">
+                <a:lumMod val="65000"/>
+                <a:lumOff val="35000"/>
+              </a:schemeClr>
+            </a:solidFill>
+          </a:ln>
+          <a:effectLst/>
+          <a:scene3d>
+            <a:camera prst="perspectiveHeroicExtremeLeftFacing" fov="1200000">
+              <a:rot lat="600000" lon="0" rev="0"/>
+            </a:camera>
+            <a:lightRig rig="threePt" dir="t"/>
+          </a:scene3d>
+          <a:sp3d>
+            <a:bevelB w="25400" h="2540000"/>
+          </a:sp3d>
+        </p:spPr>
+        <p:style>
+          <a:lnRef idx="2">
+            <a:schemeClr val="accent1">
+              <a:shade val="50000"/>
+            </a:schemeClr>
+          </a:lnRef>
+          <a:fillRef idx="1">
+            <a:schemeClr val="accent1"/>
+          </a:fillRef>
+          <a:effectRef idx="0">
+            <a:schemeClr val="accent1"/>
+          </a:effectRef>
+          <a:fontRef idx="minor">
+            <a:schemeClr val="lt1"/>
+          </a:fontRef>
+        </p:style>
+        <p:txBody>
+          <a:bodyPr rtlCol="0" anchor="ctr"/>
+          <a:lstStyle/>
+          <a:p>
+            <a:pPr algn="ctr"/>
+            <a:endParaRPr lang="sv-SE"/>
+          </a:p>
+        </p:txBody>
+      </p:sp>
+      <p:sp>
+        <p:nvSpPr>
+          <p:cNvPr id="14" name="Rektangel med rundade hörn 13"/>
+          <p:cNvSpPr/>
+          <p:nvPr/>
+        </p:nvSpPr>
+        <p:spPr>
+          <a:xfrm>
+            <a:off x="3801922" y="2079132"/>
+            <a:ext cx="2218138" cy="845299"/>
+          </a:xfrm>
+          <a:prstGeom prst="roundRect">
+            <a:avLst/>
+          </a:prstGeom>
+          <a:solidFill>
+            <a:srgbClr val="E5D7DC"/>
+          </a:solidFill>
+          <a:ln>
+            <a:solidFill>
+              <a:schemeClr val="tx1">
+                <a:lumMod val="50000"/>
+                <a:lumOff val="50000"/>
+              </a:schemeClr>
+            </a:solidFill>
+          </a:ln>
+          <a:effectLst>
+            <a:softEdge rad="25400"/>
+          </a:effectLst>
+          <a:scene3d>
+            <a:camera prst="perspectiveHeroicExtremeLeftFacing" fov="1200000">
+              <a:rot lat="240000" lon="0" rev="0"/>
+            </a:camera>
+            <a:lightRig rig="threePt" dir="t"/>
+          </a:scene3d>
+          <a:sp3d>
+            <a:bevelB h="2540000"/>
+          </a:sp3d>
+        </p:spPr>
+        <p:style>
+          <a:lnRef idx="2">
+            <a:schemeClr val="accent1">
+              <a:shade val="50000"/>
+            </a:schemeClr>
+          </a:lnRef>
+          <a:fillRef idx="1">
+            <a:schemeClr val="accent1"/>
+          </a:fillRef>
+          <a:effectRef idx="0">
+            <a:schemeClr val="accent1"/>
+          </a:effectRef>
+          <a:fontRef idx="minor">
+            <a:schemeClr val="lt1"/>
+          </a:fontRef>
+        </p:style>
+        <p:txBody>
+          <a:bodyPr rtlCol="0" anchor="ctr"/>
+          <a:lstStyle/>
+          <a:p>
+            <a:pPr algn="ctr"/>
+            <a:r>
+              <a:rPr lang="sv-SE" sz="4000" b="1" smtClean="0">
+                <a:solidFill>
+                  <a:schemeClr val="tx1"/>
+                </a:solidFill>
+              </a:rPr>
+              <a:t>0 </a:t>
+            </a:r>
+            <a:r>
+              <a:rPr lang="sv-SE" sz="4000" smtClean="0">
+                <a:solidFill>
+                  <a:schemeClr val="tx1"/>
+                </a:solidFill>
+              </a:rPr>
+              <a:t>-</a:t>
+            </a:r>
+            <a:r>
+              <a:rPr lang="sv-SE" sz="4000" b="1" smtClean="0">
+                <a:solidFill>
+                  <a:schemeClr val="tx1"/>
+                </a:solidFill>
+              </a:rPr>
+              <a:t> 5 </a:t>
+            </a:r>
+            <a:r>
+              <a:rPr lang="sv-SE" sz="4000" smtClean="0">
+                <a:solidFill>
+                  <a:schemeClr val="tx1"/>
+                </a:solidFill>
+              </a:rPr>
+              <a:t>-</a:t>
+            </a:r>
+            <a:r>
+              <a:rPr lang="sv-SE" sz="4000" b="1" smtClean="0">
+                <a:solidFill>
+                  <a:schemeClr val="tx1"/>
+                </a:solidFill>
+              </a:rPr>
+              <a:t> 10</a:t>
+            </a:r>
+            <a:endParaRPr lang="sv-SE" sz="4000" b="1">
+              <a:solidFill>
+                <a:schemeClr val="tx1"/>
+              </a:solidFill>
+            </a:endParaRPr>
+          </a:p>
+        </p:txBody>
+      </p:sp>
+      <p:grpSp>
+        <p:nvGrpSpPr>
+          <p:cNvPr id="4" name="Grupp 3"/>
+          <p:cNvGrpSpPr/>
+          <p:nvPr/>
+        </p:nvGrpSpPr>
+        <p:grpSpPr>
+          <a:xfrm>
+            <a:off x="864146" y="2326770"/>
+            <a:ext cx="3444539" cy="2993395"/>
+            <a:chOff x="864146" y="2326770"/>
+            <a:chExt cx="3444539" cy="2993395"/>
+          </a:xfrm>
+        </p:grpSpPr>
+        <p:sp>
+          <p:nvSpPr>
+            <p:cNvPr id="21" name="Ellips 20"/>
+            <p:cNvSpPr/>
+            <p:nvPr/>
+          </p:nvSpPr>
+          <p:spPr>
+            <a:xfrm flipH="1">
+              <a:off x="864146" y="2765022"/>
+              <a:ext cx="3025512" cy="1768436"/>
+            </a:xfrm>
+            <a:prstGeom prst="ellipse">
+              <a:avLst/>
+            </a:prstGeom>
+            <a:solidFill>
+              <a:srgbClr val="FFFF00"/>
+            </a:solidFill>
+            <a:ln>
+              <a:solidFill>
+                <a:srgbClr val="7030A0"/>
+              </a:solidFill>
+            </a:ln>
+            <a:effectLst>
+              <a:outerShdw blurRad="431800" dist="12700" dir="1020000" sx="117000" sy="117000" algn="tl" rotWithShape="0">
+                <a:prstClr val="black">
+                  <a:alpha val="36000"/>
+                </a:prstClr>
+              </a:outerShdw>
+              <a:softEdge rad="25400"/>
+            </a:effectLst>
+            <a:scene3d>
+              <a:camera prst="isometricRightUp">
+                <a:rot lat="600000" lon="3000000" rev="600000"/>
+              </a:camera>
+              <a:lightRig rig="threePt" dir="t"/>
+            </a:scene3d>
+            <a:sp3d extrusionH="31750"/>
+          </p:spPr>
+          <p:style>
+            <a:lnRef idx="2">
+              <a:schemeClr val="accent1">
+                <a:shade val="50000"/>
+              </a:schemeClr>
+            </a:lnRef>
+            <a:fillRef idx="1">
+              <a:schemeClr val="accent1"/>
+            </a:fillRef>
+            <a:effectRef idx="0">
+              <a:schemeClr val="accent1"/>
+            </a:effectRef>
+            <a:fontRef idx="minor">
+              <a:schemeClr val="lt1"/>
+            </a:fontRef>
+          </p:style>
+          <p:txBody>
+            <a:bodyPr rtlCol="0" anchor="ctr"/>
+            <a:lstStyle/>
+            <a:p>
+              <a:pPr algn="ctr"/>
+              <a:r>
+                <a:rPr lang="sv-SE" sz="2400" smtClean="0">
+                  <a:solidFill>
+                    <a:schemeClr val="tx1"/>
+                  </a:solidFill>
+                </a:rPr>
+                <a:t>o</a:t>
+              </a:r>
+              <a:endParaRPr lang="sv-SE" sz="2400">
+                <a:solidFill>
+                  <a:schemeClr val="tx1"/>
+                </a:solidFill>
+              </a:endParaRPr>
+            </a:p>
+          </p:txBody>
+        </p:sp>
+        <p:pic>
+          <p:nvPicPr>
+            <p:cNvPr id="2" name="Bildobjekt 1"/>
+            <p:cNvPicPr>
+              <a:picLocks noChangeAspect="1"/>
+            </p:cNvPicPr>
+            <p:nvPr/>
+          </p:nvPicPr>
+          <p:blipFill>
+            <a:blip r:embed="rId2">
+              <a:extLst>
+                <a:ext uri="{BEBA8EAE-BF5A-486C-A8C5-ECC9F3942E4B}">
+                  <a14:imgProps xmlns:a14="http://schemas.microsoft.com/office/drawing/2010/main">
+                    <a14:imgLayer r:embed="rId3">
+                      <a14:imgEffect>
+                        <a14:artisticPlasticWrap/>
+                      </a14:imgEffect>
+                    </a14:imgLayer>
+                  </a14:imgProps>
+                </a:ext>
+              </a:extLst>
+            </a:blip>
+            <a:stretch>
+              <a:fillRect/>
+            </a:stretch>
+          </p:blipFill>
+          <p:spPr>
+            <a:xfrm>
+              <a:off x="864146" y="2326770"/>
+              <a:ext cx="3444539" cy="2993395"/>
+            </a:xfrm>
+            <a:prstGeom prst="rect">
+              <a:avLst/>
+            </a:prstGeom>
+            <a:effectLst>
+              <a:softEdge rad="0"/>
+            </a:effectLst>
+          </p:spPr>
+        </p:pic>
+      </p:grpSp>
+      <p:sp>
+        <p:nvSpPr>
+          <p:cNvPr id="10" name="Rektangel med rundade hörn 9"/>
+          <p:cNvSpPr/>
+          <p:nvPr/>
+        </p:nvSpPr>
+        <p:spPr>
+          <a:xfrm>
+            <a:off x="3801922" y="3265660"/>
+            <a:ext cx="2218138" cy="845299"/>
+          </a:xfrm>
+          <a:prstGeom prst="roundRect">
+            <a:avLst/>
+          </a:prstGeom>
+          <a:solidFill>
+            <a:srgbClr val="EDEAE6"/>
+          </a:solidFill>
+          <a:ln>
+            <a:solidFill>
+              <a:schemeClr val="tx1">
+                <a:lumMod val="50000"/>
+                <a:lumOff val="50000"/>
+              </a:schemeClr>
+            </a:solidFill>
+          </a:ln>
+          <a:effectLst>
+            <a:softEdge rad="25400"/>
+          </a:effectLst>
+          <a:scene3d>
+            <a:camera prst="perspectiveHeroicExtremeLeftFacing" fov="1200000">
+              <a:rot lat="240000" lon="0" rev="0"/>
+            </a:camera>
+            <a:lightRig rig="threePt" dir="t"/>
+          </a:scene3d>
+          <a:sp3d>
+            <a:bevelB h="2540000"/>
+          </a:sp3d>
+        </p:spPr>
+        <p:style>
+          <a:lnRef idx="2">
+            <a:schemeClr val="accent1">
+              <a:shade val="50000"/>
+            </a:schemeClr>
+          </a:lnRef>
+          <a:fillRef idx="1">
+            <a:schemeClr val="accent1"/>
+          </a:fillRef>
+          <a:effectRef idx="0">
+            <a:schemeClr val="accent1"/>
+          </a:effectRef>
+          <a:fontRef idx="minor">
+            <a:schemeClr val="lt1"/>
+          </a:fontRef>
+        </p:style>
+        <p:txBody>
+          <a:bodyPr rtlCol="0" anchor="ctr"/>
+          <a:lstStyle/>
+          <a:p>
+            <a:pPr algn="ctr"/>
+            <a:r>
+              <a:rPr lang="sv-SE" sz="4000" b="1" smtClean="0">
+                <a:solidFill>
+                  <a:schemeClr val="tx1"/>
+                </a:solidFill>
+              </a:rPr>
+              <a:t>A    B    C</a:t>
+            </a:r>
+            <a:endParaRPr lang="sv-SE" sz="4000" b="1">
+              <a:solidFill>
+                <a:schemeClr val="tx1"/>
+              </a:solidFill>
+            </a:endParaRPr>
+          </a:p>
+        </p:txBody>
+      </p:sp>
+      <p:sp>
+        <p:nvSpPr>
+          <p:cNvPr id="11" name="Rektangel med rundade hörn 10"/>
+          <p:cNvSpPr/>
+          <p:nvPr/>
+        </p:nvSpPr>
+        <p:spPr>
+          <a:xfrm>
+            <a:off x="3801922" y="4450488"/>
+            <a:ext cx="2218138" cy="845299"/>
+          </a:xfrm>
+          <a:prstGeom prst="roundRect">
+            <a:avLst/>
+          </a:prstGeom>
+          <a:solidFill>
+            <a:srgbClr val="DCEBD5"/>
+          </a:solidFill>
+          <a:ln>
+            <a:solidFill>
+              <a:schemeClr val="tx1">
+                <a:lumMod val="50000"/>
+                <a:lumOff val="50000"/>
+              </a:schemeClr>
+            </a:solidFill>
+          </a:ln>
+          <a:effectLst>
+            <a:softEdge rad="25400"/>
+          </a:effectLst>
+          <a:scene3d>
+            <a:camera prst="perspectiveHeroicExtremeLeftFacing" fov="1200000">
+              <a:rot lat="240000" lon="0" rev="0"/>
+            </a:camera>
+            <a:lightRig rig="threePt" dir="t"/>
+          </a:scene3d>
+          <a:sp3d>
+            <a:bevelB h="2540000"/>
+          </a:sp3d>
+        </p:spPr>
+        <p:style>
+          <a:lnRef idx="2">
+            <a:schemeClr val="accent1">
+              <a:shade val="50000"/>
+            </a:schemeClr>
+          </a:lnRef>
+          <a:fillRef idx="1">
+            <a:schemeClr val="accent1"/>
+          </a:fillRef>
+          <a:effectRef idx="0">
+            <a:schemeClr val="accent1"/>
+          </a:effectRef>
+          <a:fontRef idx="minor">
+            <a:schemeClr val="lt1"/>
+          </a:fontRef>
+        </p:style>
+        <p:txBody>
+          <a:bodyPr wrap="square" lIns="0" tIns="0" rIns="0" bIns="0" rtlCol="0" anchor="ctr"/>
+          <a:lstStyle/>
+          <a:p>
+            <a:pPr algn="ctr"/>
+            <a:r>
+              <a:rPr lang="sv-SE" sz="4800" smtClean="0">
+                <a:solidFill>
+                  <a:schemeClr val="tx1"/>
+                </a:solidFill>
+                <a:latin typeface="+mj-lt"/>
+                <a:sym typeface="Wingdings" panose="05000000000000000000" pitchFamily="2" charset="2"/>
+              </a:rPr>
+              <a:t>    </a:t>
+            </a:r>
+            <a:endParaRPr lang="sv-SE" sz="4800">
+              <a:solidFill>
+                <a:schemeClr val="tx1"/>
+              </a:solidFill>
+              <a:latin typeface="+mj-lt"/>
+            </a:endParaRPr>
+          </a:p>
+        </p:txBody>
+      </p:sp>
+    </p:spTree>
+    <p:extLst>
+      <p:ext uri="{BB962C8B-B14F-4D97-AF65-F5344CB8AC3E}">
+        <p14:creationId xmlns:p14="http://schemas.microsoft.com/office/powerpoint/2010/main" val="413079501"/>
+      </p:ext>
+    </p:extLst>
+  </p:cSld>
+  <p:clrMapOvr>
+    <a:masterClrMapping/>
+  </p:clrMapOvr>
+  <p:timing>
+    <p:tnLst>
+      <p:par>
+        <p:cTn id="1" dur="indefinite" restart="never" nodeType="tmRoot"/>
+      </p:par>
+    </p:tnLst>
+  </p:timing>
+</p:sld>
+</file>
+
+<file path=ppt/slides/slide4.xml><?xml version="1.0" encoding="utf-8"?>
+<p:sld xmlns:a="http://schemas.openxmlformats.org/drawingml/2006/main" xmlns:r="http://schemas.openxmlformats.org/officeDocument/2006/relationships" xmlns:p="http://schemas.openxmlformats.org/presentationml/2006/main">
+  <p:cSld>
+    <p:spTree>
+      <p:nvGrpSpPr>
+        <p:cNvPr id="1" name=""/>
+        <p:cNvGrpSpPr/>
+        <p:nvPr/>
+      </p:nvGrpSpPr>
+      <p:grpSpPr>
+        <a:xfrm>
+          <a:off x="0" y="0"/>
+          <a:ext cx="0" cy="0"/>
+          <a:chOff x="0" y="0"/>
+          <a:chExt cx="0" cy="0"/>
+        </a:xfrm>
+      </p:grpSpPr>
+      <p:pic>
+        <p:nvPicPr>
+          <p:cNvPr id="5" name="Bildobjekt 4"/>
+          <p:cNvPicPr>
+            <a:picLocks noChangeAspect="1"/>
+          </p:cNvPicPr>
+          <p:nvPr/>
+        </p:nvPicPr>
+        <p:blipFill>
+          <a:blip r:embed="rId2"/>
+          <a:stretch>
+            <a:fillRect/>
+          </a:stretch>
+        </p:blipFill>
+        <p:spPr>
+          <a:xfrm>
+            <a:off x="811288" y="1591644"/>
+            <a:ext cx="5578323" cy="4017612"/>
+          </a:xfrm>
+          <a:prstGeom prst="rect">
+            <a:avLst/>
+          </a:prstGeom>
+        </p:spPr>
+      </p:pic>
+    </p:spTree>
+    <p:extLst>
+      <p:ext uri="{BB962C8B-B14F-4D97-AF65-F5344CB8AC3E}">
+        <p14:creationId xmlns:p14="http://schemas.microsoft.com/office/powerpoint/2010/main" val="2966354014"/>
+      </p:ext>
+    </p:extLst>
+  </p:cSld>
+  <p:clrMapOvr>
+    <a:masterClrMapping/>
+  </p:clrMapOvr>
+  <p:timing>
+    <p:tnLst>
+      <p:par>
+        <p:cTn id="1" dur="indefinite" restart="never" nodeType="tmRoot"/>
+      </p:par>
+    </p:tnLst>
+  </p:timing>
+</p:sld>
+</file>
+
+<file path=ppt/slides/slide5.xml><?xml version="1.0" encoding="utf-8"?>
+<p:sld xmlns:a="http://schemas.openxmlformats.org/drawingml/2006/main" xmlns:r="http://schemas.openxmlformats.org/officeDocument/2006/relationships" xmlns:p="http://schemas.openxmlformats.org/presentationml/2006/main">
+  <p:cSld>
+    <p:spTree>
+      <p:nvGrpSpPr>
+        <p:cNvPr id="1" name=""/>
+        <p:cNvGrpSpPr/>
+        <p:nvPr/>
+      </p:nvGrpSpPr>
+      <p:grpSpPr>
+        <a:xfrm>
+          <a:off x="0" y="0"/>
+          <a:ext cx="0" cy="0"/>
+          <a:chOff x="0" y="0"/>
+          <a:chExt cx="0" cy="0"/>
+        </a:xfrm>
+      </p:grpSpPr>
+      <p:sp>
+        <p:nvSpPr>
+          <p:cNvPr id="3" name="Rektangel med rundade hörn 2"/>
+          <p:cNvSpPr/>
+          <p:nvPr/>
+        </p:nvSpPr>
+        <p:spPr>
+          <a:xfrm>
+            <a:off x="864146" y="1800250"/>
+            <a:ext cx="5467441" cy="3739606"/>
+          </a:xfrm>
+          <a:prstGeom prst="roundRect">
+            <a:avLst/>
+          </a:prstGeom>
+          <a:gradFill flip="none" rotWithShape="1">
+            <a:gsLst>
+              <a:gs pos="0">
+                <a:schemeClr val="accent5">
+                  <a:lumMod val="67000"/>
+                </a:schemeClr>
+              </a:gs>
+              <a:gs pos="48000">
+                <a:schemeClr val="accent5">
+                  <a:lumMod val="97000"/>
+                  <a:lumOff val="3000"/>
+                </a:schemeClr>
+              </a:gs>
+              <a:gs pos="100000">
+                <a:schemeClr val="accent5">
+                  <a:lumMod val="60000"/>
+                  <a:lumOff val="40000"/>
+                </a:schemeClr>
+              </a:gs>
+            </a:gsLst>
+            <a:lin ang="16200000" scaled="1"/>
+            <a:tileRect/>
+          </a:gradFill>
+          <a:ln>
+            <a:solidFill>
+              <a:schemeClr val="tx1">
+                <a:lumMod val="65000"/>
+                <a:lumOff val="35000"/>
+              </a:schemeClr>
+            </a:solidFill>
+          </a:ln>
+          <a:effectLst/>
+          <a:scene3d>
+            <a:camera prst="perspectiveHeroicExtremeLeftFacing" fov="1200000">
+              <a:rot lat="600000" lon="0" rev="0"/>
+            </a:camera>
+            <a:lightRig rig="threePt" dir="t"/>
+          </a:scene3d>
+          <a:sp3d>
+            <a:bevelB w="25400" h="2540000"/>
+          </a:sp3d>
+        </p:spPr>
+        <p:style>
+          <a:lnRef idx="2">
+            <a:schemeClr val="accent1">
+              <a:shade val="50000"/>
+            </a:schemeClr>
+          </a:lnRef>
+          <a:fillRef idx="1">
+            <a:schemeClr val="accent1"/>
+          </a:fillRef>
+          <a:effectRef idx="0">
+            <a:schemeClr val="accent1"/>
+          </a:effectRef>
+          <a:fontRef idx="minor">
+            <a:schemeClr val="lt1"/>
+          </a:fontRef>
+        </p:style>
+        <p:txBody>
+          <a:bodyPr rtlCol="0" anchor="ctr"/>
+          <a:lstStyle/>
+          <a:p>
+            <a:pPr algn="ctr"/>
+            <a:endParaRPr lang="sv-SE"/>
+          </a:p>
+        </p:txBody>
+      </p:sp>
+      <p:grpSp>
+        <p:nvGrpSpPr>
+          <p:cNvPr id="4" name="Grupp 3"/>
+          <p:cNvGrpSpPr/>
+          <p:nvPr/>
+        </p:nvGrpSpPr>
+        <p:grpSpPr>
+          <a:xfrm>
+            <a:off x="1363035" y="1792640"/>
+            <a:ext cx="4968552" cy="4154000"/>
+            <a:chOff x="864146" y="2326770"/>
+            <a:chExt cx="3444539" cy="2993395"/>
+          </a:xfrm>
+        </p:grpSpPr>
+        <p:sp>
+          <p:nvSpPr>
+            <p:cNvPr id="21" name="Ellips 20"/>
+            <p:cNvSpPr/>
+            <p:nvPr/>
+          </p:nvSpPr>
+          <p:spPr>
+            <a:xfrm flipH="1">
+              <a:off x="864146" y="2765022"/>
+              <a:ext cx="3025512" cy="1768436"/>
+            </a:xfrm>
+            <a:prstGeom prst="ellipse">
+              <a:avLst/>
+            </a:prstGeom>
+            <a:solidFill>
+              <a:srgbClr val="FFFF00"/>
+            </a:solidFill>
+            <a:ln>
+              <a:solidFill>
+                <a:srgbClr val="7030A0"/>
+              </a:solidFill>
+            </a:ln>
+            <a:effectLst>
+              <a:outerShdw blurRad="431800" dist="12700" dir="1020000" sx="117000" sy="117000" algn="tl" rotWithShape="0">
+                <a:prstClr val="black">
+                  <a:alpha val="36000"/>
+                </a:prstClr>
+              </a:outerShdw>
+              <a:softEdge rad="25400"/>
+            </a:effectLst>
+            <a:scene3d>
+              <a:camera prst="isometricRightUp">
+                <a:rot lat="600000" lon="3000000" rev="600000"/>
+              </a:camera>
+              <a:lightRig rig="threePt" dir="t"/>
+            </a:scene3d>
+            <a:sp3d extrusionH="31750"/>
+          </p:spPr>
+          <p:style>
+            <a:lnRef idx="2">
+              <a:schemeClr val="accent1">
+                <a:shade val="50000"/>
+              </a:schemeClr>
+            </a:lnRef>
+            <a:fillRef idx="1">
+              <a:schemeClr val="accent1"/>
+            </a:fillRef>
+            <a:effectRef idx="0">
+              <a:schemeClr val="accent1"/>
+            </a:effectRef>
+            <a:fontRef idx="minor">
+              <a:schemeClr val="lt1"/>
+            </a:fontRef>
+          </p:style>
+          <p:txBody>
+            <a:bodyPr rtlCol="0" anchor="ctr"/>
+            <a:lstStyle/>
+            <a:p>
+              <a:pPr algn="ctr"/>
+              <a:r>
+                <a:rPr lang="sv-SE" sz="2400" smtClean="0">
+                  <a:solidFill>
+                    <a:schemeClr val="tx1"/>
+                  </a:solidFill>
+                </a:rPr>
+                <a:t>o</a:t>
+              </a:r>
+              <a:endParaRPr lang="sv-SE" sz="2400">
+                <a:solidFill>
+                  <a:schemeClr val="tx1"/>
+                </a:solidFill>
+              </a:endParaRPr>
+            </a:p>
+          </p:txBody>
+        </p:sp>
+        <p:pic>
+          <p:nvPicPr>
+            <p:cNvPr id="2" name="Bildobjekt 1"/>
+            <p:cNvPicPr>
+              <a:picLocks noChangeAspect="1"/>
+            </p:cNvPicPr>
+            <p:nvPr/>
+          </p:nvPicPr>
+          <p:blipFill>
+            <a:blip r:embed="rId2">
+              <a:extLst>
+                <a:ext uri="{BEBA8EAE-BF5A-486C-A8C5-ECC9F3942E4B}">
+                  <a14:imgProps xmlns:a14="http://schemas.microsoft.com/office/drawing/2010/main">
+                    <a14:imgLayer r:embed="rId3">
+                      <a14:imgEffect>
+                        <a14:artisticPlasticWrap/>
+                      </a14:imgEffect>
+                    </a14:imgLayer>
+                  </a14:imgProps>
+                </a:ext>
+              </a:extLst>
+            </a:blip>
+            <a:stretch>
+              <a:fillRect/>
+            </a:stretch>
+          </p:blipFill>
+          <p:spPr>
+            <a:xfrm>
+              <a:off x="864146" y="2326770"/>
+              <a:ext cx="3444539" cy="2993395"/>
+            </a:xfrm>
+            <a:prstGeom prst="rect">
+              <a:avLst/>
+            </a:prstGeom>
+            <a:effectLst>
+              <a:softEdge rad="0"/>
+            </a:effectLst>
+          </p:spPr>
+        </p:pic>
+      </p:grpSp>
+    </p:spTree>
+    <p:extLst>
+      <p:ext uri="{BB962C8B-B14F-4D97-AF65-F5344CB8AC3E}">
+        <p14:creationId xmlns:p14="http://schemas.microsoft.com/office/powerpoint/2010/main" val="1548816051"/>
+      </p:ext>
+    </p:extLst>
+  </p:cSld>
+  <p:clrMapOvr>
+    <a:masterClrMapping/>
+  </p:clrMapOvr>
+  <p:timing>
+    <p:tnLst>
+      <p:par>
+        <p:cTn id="1" dur="indefinite" restart="never" nodeType="tmRoot"/>
+      </p:par>
+    </p:tnLst>
+  </p:timing>
+</p:sld>
+</file>
+
+<file path=ppt/slides/slide6.xml><?xml version="1.0" encoding="utf-8"?>
+<p:sld xmlns:a="http://schemas.openxmlformats.org/drawingml/2006/main" xmlns:r="http://schemas.openxmlformats.org/officeDocument/2006/relationships" xmlns:p="http://schemas.openxmlformats.org/presentationml/2006/main">
+  <p:cSld>
+    <p:spTree>
+      <p:nvGrpSpPr>
+        <p:cNvPr id="1" name=""/>
+        <p:cNvGrpSpPr/>
+        <p:nvPr/>
+      </p:nvGrpSpPr>
+      <p:grpSpPr>
+        <a:xfrm>
+          <a:off x="0" y="0"/>
+          <a:ext cx="0" cy="0"/>
+          <a:chOff x="0" y="0"/>
+          <a:chExt cx="0" cy="0"/>
+        </a:xfrm>
+      </p:grpSpPr>
+      <p:pic>
+        <p:nvPicPr>
+          <p:cNvPr id="5" name="Bildobjekt 4"/>
+          <p:cNvPicPr>
+            <a:picLocks noChangeAspect="1"/>
+          </p:cNvPicPr>
+          <p:nvPr/>
+        </p:nvPicPr>
+        <p:blipFill>
+          <a:blip r:embed="rId2"/>
+          <a:stretch>
+            <a:fillRect/>
+          </a:stretch>
+        </p:blipFill>
+        <p:spPr>
+          <a:xfrm>
+            <a:off x="811288" y="1381313"/>
+            <a:ext cx="5578323" cy="4438273"/>
+          </a:xfrm>
+          <a:prstGeom prst="rect">
+            <a:avLst/>
+          </a:prstGeom>
+        </p:spPr>
+      </p:pic>
+    </p:spTree>
+    <p:extLst>
+      <p:ext uri="{BB962C8B-B14F-4D97-AF65-F5344CB8AC3E}">
+        <p14:creationId xmlns:p14="http://schemas.microsoft.com/office/powerpoint/2010/main" val="1475563369"/>
+      </p:ext>
+    </p:extLst>
+  </p:cSld>
+  <p:clrMapOvr>
+    <a:masterClrMapping/>
+  </p:clrMapOvr>
+  <p:timing>
+    <p:tnLst>
+      <p:par>
+        <p:cTn id="1" dur="indefinite" restart="never" nodeType="tmRoot"/>
+      </p:par>
+    </p:tnLst>
+  </p:timing>
+</p:sld>
+</file>
+
 <file path=ppt/theme/theme1.xml><?xml version="1.0" encoding="utf-8"?>
 <a:theme xmlns:a="http://schemas.openxmlformats.org/drawingml/2006/main" name="Office-tema">
   <a:themeElements>

</xml_diff>